<commit_message>
Game plan for Monday.
</commit_message>
<xml_diff>
--- a/Docs/SIMBAv2-HighLevel.pptx
+++ b/Docs/SIMBAv2-HighLevel.pptx
@@ -5383,8 +5383,8 @@
         </p:nvSpPr>
         <p:spPr>
           <a:xfrm>
-            <a:off x="5181600" y="3200400"/>
-            <a:ext cx="322551" cy="369332"/>
+            <a:off x="5186528" y="3212068"/>
+            <a:ext cx="354806" cy="369332"/>
           </a:xfrm>
           <a:prstGeom prst="rect">
             <a:avLst/>
@@ -8401,11 +8401,7 @@
           <a:p>
             <a:r>
               <a:rPr lang="en-US" sz="800" dirty="0" smtClean="0"/>
-              <a:t>1- </a:t>
-            </a:r>
-            <a:r>
-              <a:rPr lang="en-US" sz="800" dirty="0" smtClean="0"/>
-              <a:t>P_2</a:t>
+              <a:t>1- P_2</a:t>
             </a:r>
             <a:endParaRPr lang="en-US" sz="800" dirty="0"/>
           </a:p>

</xml_diff>